<commit_message>
changed classroom name slide
</commit_message>
<xml_diff>
--- a/slides/GitHubClassroom-Instructor.pptx
+++ b/slides/GitHubClassroom-Instructor.pptx
@@ -621,7 +621,7 @@
           <a:p>
             <a:fld id="{8F7D2F49-1857-4E7D-8050-DC698401AAB7}" type="datetimeFigureOut">
               <a:rPr lang="en-US" smtClean="0"/>
-              <a:t>6/28/2023</a:t>
+              <a:t>7/10/2023</a:t>
             </a:fld>
             <a:endParaRPr lang="en-US"/>
           </a:p>
@@ -1968,7 +1968,7 @@
           <a:p>
             <a:fld id="{8F7D2F49-1857-4E7D-8050-DC698401AAB7}" type="datetimeFigureOut">
               <a:rPr lang="en-US" smtClean="0"/>
-              <a:t>6/28/2023</a:t>
+              <a:t>7/10/2023</a:t>
             </a:fld>
             <a:endParaRPr lang="en-US"/>
           </a:p>
@@ -4397,8 +4397,8 @@
         </p:nvSpPr>
         <p:spPr>
           <a:xfrm>
-            <a:off x="1156448" y="1068677"/>
-            <a:ext cx="7179478" cy="683955"/>
+            <a:off x="391886" y="1874905"/>
+            <a:ext cx="5801445" cy="2581835"/>
           </a:xfrm>
           <a:prstGeom prst="rect">
             <a:avLst/>
@@ -4433,10 +4433,57 @@
               <a:buChar char="•"/>
             </a:pPr>
             <a:r>
-              <a:rPr lang="en-US" sz="2800">
+              <a:rPr lang="en-US" sz="3200">
                 <a:latin typeface="Calibri (Body)"/>
               </a:rPr>
               <a:t>Choose Your Preferred Option</a:t>
+            </a:r>
+            <a:endParaRPr lang="en-US" sz="3200">
+              <a:latin typeface="Calibri (Body)"/>
+              <a:ea typeface="+mn-ea"/>
+              <a:cs typeface="+mn-cs"/>
+            </a:endParaRPr>
+          </a:p>
+          <a:p>
+            <a:pPr marL="684213" lvl="1" indent="-227013">
+              <a:buFont typeface="Arial" panose="020B0604020202020204" pitchFamily="34" charset="0"/>
+              <a:buChar char="•"/>
+            </a:pPr>
+            <a:r>
+              <a:rPr lang="en-US" sz="2800">
+                <a:latin typeface="Calibri (Body)"/>
+                <a:ea typeface="+mn-ea"/>
+                <a:cs typeface="+mn-cs"/>
+              </a:rPr>
+              <a:t>Clone the student repo</a:t>
+            </a:r>
+          </a:p>
+          <a:p>
+            <a:pPr marL="684213" lvl="1" indent="-227013">
+              <a:buFont typeface="Arial" panose="020B0604020202020204" pitchFamily="34" charset="0"/>
+              <a:buChar char="•"/>
+            </a:pPr>
+            <a:r>
+              <a:rPr lang="en-US" sz="2800">
+                <a:latin typeface="Calibri (Body)"/>
+                <a:ea typeface="+mn-ea"/>
+                <a:cs typeface="+mn-cs"/>
+              </a:rPr>
+              <a:t>Open with GH Desktop</a:t>
+            </a:r>
+          </a:p>
+          <a:p>
+            <a:pPr marL="684213" lvl="1" indent="-227013">
+              <a:buFont typeface="Arial" panose="020B0604020202020204" pitchFamily="34" charset="0"/>
+              <a:buChar char="•"/>
+            </a:pPr>
+            <a:r>
+              <a:rPr lang="en-US" sz="2800">
+                <a:latin typeface="Calibri (Body)"/>
+                <a:ea typeface="+mn-ea"/>
+                <a:cs typeface="+mn-cs"/>
+              </a:rPr>
+              <a:t>Download Zip</a:t>
             </a:r>
             <a:endParaRPr lang="en-US" sz="2800" dirty="0">
               <a:latin typeface="Calibri (Body)"/>
@@ -5642,7 +5689,7 @@
         </p:nvSpPr>
         <p:spPr>
           <a:xfrm>
-            <a:off x="838200" y="1147665"/>
+            <a:off x="838200" y="1416607"/>
             <a:ext cx="2493335" cy="1411237"/>
           </a:xfrm>
         </p:spPr>
@@ -5659,10 +5706,10 @@
       </p:sp>
       <p:pic>
         <p:nvPicPr>
-          <p:cNvPr id="5" name="Picture 4">
-            <a:extLst>
-              <a:ext uri="{FF2B5EF4-FFF2-40B4-BE49-F238E27FC236}">
-                <a16:creationId xmlns:a16="http://schemas.microsoft.com/office/drawing/2014/main" id="{B1D9E4D8-0E24-4079-AE16-E7264D1A7827}"/>
+          <p:cNvPr id="4" name="Picture 3">
+            <a:extLst>
+              <a:ext uri="{FF2B5EF4-FFF2-40B4-BE49-F238E27FC236}">
+                <a16:creationId xmlns:a16="http://schemas.microsoft.com/office/drawing/2014/main" id="{B778D2AD-1813-989C-1F46-B1DAF167ABAC}"/>
               </a:ext>
             </a:extLst>
           </p:cNvPr>
@@ -5679,15 +5726,17 @@
         </p:blipFill>
         <p:spPr>
           <a:xfrm>
-            <a:off x="3903809" y="1051560"/>
-            <a:ext cx="8071255" cy="4754880"/>
+            <a:off x="3659261" y="1335708"/>
+            <a:ext cx="6846999" cy="4186583"/>
           </a:xfrm>
           <a:prstGeom prst="rect">
             <a:avLst/>
           </a:prstGeom>
           <a:ln>
             <a:solidFill>
-              <a:schemeClr val="tx1"/>
+              <a:schemeClr val="tx2">
+                <a:lumMod val="50000"/>
+              </a:schemeClr>
             </a:solidFill>
           </a:ln>
         </p:spPr>

</xml_diff>